<commit_message>
finish day 4, add references
</commit_message>
<xml_diff>
--- a/day4/Day4-Git_project_assignment.pptx
+++ b/day4/Day4-Git_project_assignment.pptx
@@ -7,6 +7,8 @@
   <p:sldIdLst>
     <p:sldId id="256" r:id="rId2"/>
     <p:sldId id="257" r:id="rId3"/>
+    <p:sldId id="258" r:id="rId4"/>
+    <p:sldId id="259" r:id="rId5"/>
   </p:sldIdLst>
   <p:sldSz cx="12192000" cy="6858000"/>
   <p:notesSz cx="6858000" cy="9144000"/>
@@ -105,6 +107,11 @@
       </a:defRPr>
     </a:lvl9pPr>
   </p:defaultTextStyle>
+  <p:extLst>
+    <p:ext uri="{EFAFB233-063F-42B5-8137-9DF3F51BA10A}">
+      <p15:sldGuideLst xmlns:p15="http://schemas.microsoft.com/office/powerpoint/2012/main"/>
+    </p:ext>
+  </p:extLst>
 </p:presentation>
 </file>
 
@@ -239,7 +246,7 @@
           <a:p>
             <a:fld id="{EC7FD5C0-37DA-455D-B491-7B841843C053}" type="datetimeFigureOut">
               <a:rPr lang="en-US" smtClean="0"/>
-              <a:t>8/11/2023</a:t>
+              <a:t>8/12/2023</a:t>
             </a:fld>
             <a:endParaRPr lang="en-US"/>
           </a:p>
@@ -409,7 +416,7 @@
           <a:p>
             <a:fld id="{EC7FD5C0-37DA-455D-B491-7B841843C053}" type="datetimeFigureOut">
               <a:rPr lang="en-US" smtClean="0"/>
-              <a:t>8/11/2023</a:t>
+              <a:t>8/12/2023</a:t>
             </a:fld>
             <a:endParaRPr lang="en-US"/>
           </a:p>
@@ -589,7 +596,7 @@
           <a:p>
             <a:fld id="{EC7FD5C0-37DA-455D-B491-7B841843C053}" type="datetimeFigureOut">
               <a:rPr lang="en-US" smtClean="0"/>
-              <a:t>8/11/2023</a:t>
+              <a:t>8/12/2023</a:t>
             </a:fld>
             <a:endParaRPr lang="en-US"/>
           </a:p>
@@ -759,7 +766,7 @@
           <a:p>
             <a:fld id="{EC7FD5C0-37DA-455D-B491-7B841843C053}" type="datetimeFigureOut">
               <a:rPr lang="en-US" smtClean="0"/>
-              <a:t>8/11/2023</a:t>
+              <a:t>8/12/2023</a:t>
             </a:fld>
             <a:endParaRPr lang="en-US"/>
           </a:p>
@@ -1005,7 +1012,7 @@
           <a:p>
             <a:fld id="{EC7FD5C0-37DA-455D-B491-7B841843C053}" type="datetimeFigureOut">
               <a:rPr lang="en-US" smtClean="0"/>
-              <a:t>8/11/2023</a:t>
+              <a:t>8/12/2023</a:t>
             </a:fld>
             <a:endParaRPr lang="en-US"/>
           </a:p>
@@ -1237,7 +1244,7 @@
           <a:p>
             <a:fld id="{EC7FD5C0-37DA-455D-B491-7B841843C053}" type="datetimeFigureOut">
               <a:rPr lang="en-US" smtClean="0"/>
-              <a:t>8/11/2023</a:t>
+              <a:t>8/12/2023</a:t>
             </a:fld>
             <a:endParaRPr lang="en-US"/>
           </a:p>
@@ -1604,7 +1611,7 @@
           <a:p>
             <a:fld id="{EC7FD5C0-37DA-455D-B491-7B841843C053}" type="datetimeFigureOut">
               <a:rPr lang="en-US" smtClean="0"/>
-              <a:t>8/11/2023</a:t>
+              <a:t>8/12/2023</a:t>
             </a:fld>
             <a:endParaRPr lang="en-US"/>
           </a:p>
@@ -1722,7 +1729,7 @@
           <a:p>
             <a:fld id="{EC7FD5C0-37DA-455D-B491-7B841843C053}" type="datetimeFigureOut">
               <a:rPr lang="en-US" smtClean="0"/>
-              <a:t>8/11/2023</a:t>
+              <a:t>8/12/2023</a:t>
             </a:fld>
             <a:endParaRPr lang="en-US"/>
           </a:p>
@@ -1817,7 +1824,7 @@
           <a:p>
             <a:fld id="{EC7FD5C0-37DA-455D-B491-7B841843C053}" type="datetimeFigureOut">
               <a:rPr lang="en-US" smtClean="0"/>
-              <a:t>8/11/2023</a:t>
+              <a:t>8/12/2023</a:t>
             </a:fld>
             <a:endParaRPr lang="en-US"/>
           </a:p>
@@ -2094,7 +2101,7 @@
           <a:p>
             <a:fld id="{EC7FD5C0-37DA-455D-B491-7B841843C053}" type="datetimeFigureOut">
               <a:rPr lang="en-US" smtClean="0"/>
-              <a:t>8/11/2023</a:t>
+              <a:t>8/12/2023</a:t>
             </a:fld>
             <a:endParaRPr lang="en-US"/>
           </a:p>
@@ -2347,7 +2354,7 @@
           <a:p>
             <a:fld id="{EC7FD5C0-37DA-455D-B491-7B841843C053}" type="datetimeFigureOut">
               <a:rPr lang="en-US" smtClean="0"/>
-              <a:t>8/11/2023</a:t>
+              <a:t>8/12/2023</a:t>
             </a:fld>
             <a:endParaRPr lang="en-US"/>
           </a:p>
@@ -2560,7 +2567,7 @@
           <a:p>
             <a:fld id="{EC7FD5C0-37DA-455D-B491-7B841843C053}" type="datetimeFigureOut">
               <a:rPr lang="en-US" smtClean="0"/>
-              <a:t>8/11/2023</a:t>
+              <a:t>8/12/2023</a:t>
             </a:fld>
             <a:endParaRPr lang="en-US"/>
           </a:p>
@@ -2981,15 +2988,23 @@
           <a:lstStyle/>
           <a:p>
             <a:r>
+              <a:rPr lang="en-US" dirty="0" err="1" smtClean="0"/>
+              <a:t>Git</a:t>
+            </a:r>
+            <a:r>
               <a:rPr lang="en-US" dirty="0" smtClean="0"/>
-              <a:t>Large Language model</a:t>
+              <a:t> </a:t>
+            </a:r>
+            <a:r>
+              <a:rPr lang="en-US" dirty="0" smtClean="0"/>
+              <a:t>&amp; GitHub</a:t>
             </a:r>
             <a:br>
               <a:rPr lang="en-US" dirty="0" smtClean="0"/>
             </a:br>
             <a:r>
               <a:rPr lang="en-US" dirty="0" smtClean="0"/>
-              <a:t>Generative AI</a:t>
+              <a:t>Final Project </a:t>
             </a:r>
             <a:endParaRPr lang="en-US" dirty="0"/>
           </a:p>
@@ -3059,7 +3074,11 @@
           <a:bodyPr/>
           <a:lstStyle/>
           <a:p>
-            <a:endParaRPr lang="en-US"/>
+            <a:r>
+              <a:rPr lang="en-US" dirty="0" err="1" smtClean="0"/>
+              <a:t>Git</a:t>
+            </a:r>
+            <a:endParaRPr lang="en-US" dirty="0"/>
           </a:p>
         </p:txBody>
       </p:sp>
@@ -3086,6 +3105,182 @@
     <p:extLst>
       <p:ext uri="{BB962C8B-B14F-4D97-AF65-F5344CB8AC3E}">
         <p14:creationId xmlns:p14="http://schemas.microsoft.com/office/powerpoint/2010/main" val="239039649"/>
+      </p:ext>
+    </p:extLst>
+  </p:cSld>
+  <p:clrMapOvr>
+    <a:masterClrMapping/>
+  </p:clrMapOvr>
+</p:sld>
+</file>
+
+<file path=ppt/slides/slide3.xml><?xml version="1.0" encoding="utf-8"?>
+<p:sld xmlns:a="http://schemas.openxmlformats.org/drawingml/2006/main" xmlns:r="http://schemas.openxmlformats.org/officeDocument/2006/relationships" xmlns:p="http://schemas.openxmlformats.org/presentationml/2006/main">
+  <p:cSld>
+    <p:spTree>
+      <p:nvGrpSpPr>
+        <p:cNvPr id="1" name=""/>
+        <p:cNvGrpSpPr/>
+        <p:nvPr/>
+      </p:nvGrpSpPr>
+      <p:grpSpPr>
+        <a:xfrm>
+          <a:off x="0" y="0"/>
+          <a:ext cx="0" cy="0"/>
+          <a:chOff x="0" y="0"/>
+          <a:chExt cx="0" cy="0"/>
+        </a:xfrm>
+      </p:grpSpPr>
+      <p:sp>
+        <p:nvSpPr>
+          <p:cNvPr id="2" name="标题 1"/>
+          <p:cNvSpPr>
+            <a:spLocks noGrp="1"/>
+          </p:cNvSpPr>
+          <p:nvPr>
+            <p:ph type="title"/>
+          </p:nvPr>
+        </p:nvSpPr>
+        <p:spPr/>
+        <p:txBody>
+          <a:bodyPr/>
+          <a:lstStyle/>
+          <a:p>
+            <a:r>
+              <a:rPr lang="en-US" dirty="0" err="1" smtClean="0"/>
+              <a:t>Github</a:t>
+            </a:r>
+            <a:endParaRPr lang="en-US" dirty="0"/>
+          </a:p>
+        </p:txBody>
+      </p:sp>
+      <p:sp>
+        <p:nvSpPr>
+          <p:cNvPr id="3" name="内容占位符 2"/>
+          <p:cNvSpPr>
+            <a:spLocks noGrp="1"/>
+          </p:cNvSpPr>
+          <p:nvPr>
+            <p:ph idx="1"/>
+          </p:nvPr>
+        </p:nvSpPr>
+        <p:spPr/>
+        <p:txBody>
+          <a:bodyPr/>
+          <a:lstStyle/>
+          <a:p>
+            <a:endParaRPr lang="en-US"/>
+          </a:p>
+        </p:txBody>
+      </p:sp>
+    </p:spTree>
+    <p:extLst>
+      <p:ext uri="{BB962C8B-B14F-4D97-AF65-F5344CB8AC3E}">
+        <p14:creationId xmlns:p14="http://schemas.microsoft.com/office/powerpoint/2010/main" val="2951276771"/>
+      </p:ext>
+    </p:extLst>
+  </p:cSld>
+  <p:clrMapOvr>
+    <a:masterClrMapping/>
+  </p:clrMapOvr>
+</p:sld>
+</file>
+
+<file path=ppt/slides/slide4.xml><?xml version="1.0" encoding="utf-8"?>
+<p:sld xmlns:a="http://schemas.openxmlformats.org/drawingml/2006/main" xmlns:r="http://schemas.openxmlformats.org/officeDocument/2006/relationships" xmlns:p="http://schemas.openxmlformats.org/presentationml/2006/main">
+  <p:cSld>
+    <p:spTree>
+      <p:nvGrpSpPr>
+        <p:cNvPr id="1" name=""/>
+        <p:cNvGrpSpPr/>
+        <p:nvPr/>
+      </p:nvGrpSpPr>
+      <p:grpSpPr>
+        <a:xfrm>
+          <a:off x="0" y="0"/>
+          <a:ext cx="0" cy="0"/>
+          <a:chOff x="0" y="0"/>
+          <a:chExt cx="0" cy="0"/>
+        </a:xfrm>
+      </p:grpSpPr>
+      <p:sp>
+        <p:nvSpPr>
+          <p:cNvPr id="2" name="标题 1"/>
+          <p:cNvSpPr>
+            <a:spLocks noGrp="1"/>
+          </p:cNvSpPr>
+          <p:nvPr>
+            <p:ph type="title"/>
+          </p:nvPr>
+        </p:nvSpPr>
+        <p:spPr/>
+        <p:txBody>
+          <a:bodyPr/>
+          <a:lstStyle/>
+          <a:p>
+            <a:r>
+              <a:rPr lang="en-US" dirty="0" smtClean="0"/>
+              <a:t>Final project</a:t>
+            </a:r>
+            <a:endParaRPr lang="en-US" dirty="0"/>
+          </a:p>
+        </p:txBody>
+      </p:sp>
+      <p:sp>
+        <p:nvSpPr>
+          <p:cNvPr id="3" name="内容占位符 2"/>
+          <p:cNvSpPr>
+            <a:spLocks noGrp="1"/>
+          </p:cNvSpPr>
+          <p:nvPr>
+            <p:ph idx="1"/>
+          </p:nvPr>
+        </p:nvSpPr>
+        <p:spPr/>
+        <p:txBody>
+          <a:bodyPr/>
+          <a:lstStyle/>
+          <a:p>
+            <a:r>
+              <a:rPr lang="en-US" dirty="0" smtClean="0"/>
+              <a:t>Options</a:t>
+            </a:r>
+          </a:p>
+          <a:p>
+            <a:r>
+              <a:rPr lang="en-US" dirty="0" smtClean="0"/>
+              <a:t>Requirements</a:t>
+            </a:r>
+          </a:p>
+          <a:p>
+            <a:r>
+              <a:rPr lang="en-US" dirty="0" smtClean="0"/>
+              <a:t>Team</a:t>
+            </a:r>
+          </a:p>
+          <a:p>
+            <a:r>
+              <a:rPr lang="en-US" dirty="0" smtClean="0"/>
+              <a:t>Deadline</a:t>
+            </a:r>
+          </a:p>
+          <a:p>
+            <a:r>
+              <a:rPr lang="en-US" dirty="0" smtClean="0"/>
+              <a:t>How </a:t>
+            </a:r>
+            <a:r>
+              <a:rPr lang="en-US" smtClean="0"/>
+              <a:t>to present</a:t>
+            </a:r>
+            <a:endParaRPr lang="en-US" dirty="0"/>
+          </a:p>
+        </p:txBody>
+      </p:sp>
+    </p:spTree>
+    <p:extLst>
+      <p:ext uri="{BB962C8B-B14F-4D97-AF65-F5344CB8AC3E}">
+        <p14:creationId xmlns:p14="http://schemas.microsoft.com/office/powerpoint/2010/main" val="101521466"/>
       </p:ext>
     </p:extLst>
   </p:cSld>

</xml_diff>